<commit_message>
docs: atualizar ppt curso HTML5_e_CSS3-parte_3
</commit_message>
<xml_diff>
--- a/Trilhas/[Iniciante em Programação T5 - ONE]/Material/05.HTML5_e_CSS3-parte_3.pptx
+++ b/Trilhas/[Iniciante em Programação T5 - ONE]/Material/05.HTML5_e_CSS3-parte_3.pptx
@@ -5,10 +5,10 @@
     <p:sldMasterId id="2147483660" r:id="rId1"/>
   </p:sldMasterIdLst>
   <p:notesMasterIdLst>
-    <p:notesMasterId r:id="rId13"/>
+    <p:notesMasterId r:id="rId15"/>
   </p:notesMasterIdLst>
   <p:handoutMasterIdLst>
-    <p:handoutMasterId r:id="rId14"/>
+    <p:handoutMasterId r:id="rId16"/>
   </p:handoutMasterIdLst>
   <p:sldIdLst>
     <p:sldId id="256" r:id="rId2"/>
@@ -21,7 +21,9 @@
     <p:sldId id="293" r:id="rId9"/>
     <p:sldId id="294" r:id="rId10"/>
     <p:sldId id="295" r:id="rId11"/>
-    <p:sldId id="287" r:id="rId12"/>
+    <p:sldId id="296" r:id="rId12"/>
+    <p:sldId id="297" r:id="rId13"/>
+    <p:sldId id="298" r:id="rId14"/>
   </p:sldIdLst>
   <p:sldSz cx="12192000" cy="6858000"/>
   <p:notesSz cx="6858000" cy="9144000"/>
@@ -135,7 +137,9 @@
             <p14:sldId id="293"/>
             <p14:sldId id="294"/>
             <p14:sldId id="295"/>
-            <p14:sldId id="287"/>
+            <p14:sldId id="296"/>
+            <p14:sldId id="297"/>
+            <p14:sldId id="298"/>
           </p14:sldIdLst>
         </p14:section>
       </p14:sectionLst>
@@ -251,7 +255,7 @@
             <a:pPr rtl="0"/>
             <a:fld id="{12E8EFE0-5F29-4A8F-882F-2C5E3702D946}" type="datetime1">
               <a:rPr lang="pt-BR" smtClean="0"/>
-              <a:t>10/05/2023</a:t>
+              <a:t>11/05/2023</a:t>
             </a:fld>
             <a:endParaRPr lang="pt-BR"/>
           </a:p>
@@ -421,7 +425,7 @@
             <a:fld id="{25C915AE-A572-46FB-8F05-B028884B90C4}" type="datetime1">
               <a:rPr lang="pt-BR" smtClean="0"/>
               <a:pPr/>
-              <a:t>10/05/2023</a:t>
+              <a:t>11/05/2023</a:t>
             </a:fld>
             <a:endParaRPr lang="pt-BR" dirty="0"/>
           </a:p>
@@ -1221,7 +1225,7 @@
             <a:pPr rtl="0"/>
             <a:fld id="{DFFABA16-A60E-4C58-9DC9-284576B05B35}" type="datetime1">
               <a:rPr lang="pt-BR" noProof="0" smtClean="0"/>
-              <a:t>10/05/2023</a:t>
+              <a:t>11/05/2023</a:t>
             </a:fld>
             <a:endParaRPr lang="pt-BR" noProof="0"/>
           </a:p>
@@ -1847,7 +1851,7 @@
             <a:pPr rtl="0"/>
             <a:fld id="{495CCA5C-24EB-4738-B463-0ADFEF5D3564}" type="datetime1">
               <a:rPr lang="pt-BR" noProof="0" smtClean="0"/>
-              <a:t>10/05/2023</a:t>
+              <a:t>11/05/2023</a:t>
             </a:fld>
             <a:endParaRPr lang="pt-BR" noProof="0" dirty="0"/>
           </a:p>
@@ -2456,10 +2460,450 @@
             <p:ph sz="quarter" idx="10"/>
           </p:nvPr>
         </p:nvSpPr>
-        <p:spPr/>
+        <p:spPr>
+          <a:xfrm>
+            <a:off x="539496" y="1435608"/>
+            <a:ext cx="8378362" cy="5122508"/>
+          </a:xfrm>
+        </p:spPr>
         <p:txBody>
-          <a:bodyPr/>
+          <a:bodyPr>
+            <a:normAutofit/>
+          </a:bodyPr>
           <a:lstStyle/>
+          <a:p>
+            <a:r>
+              <a:rPr lang="pt-BR" dirty="0"/>
+              <a:t>No CSS, quando criamos uma configuração específica para um elemento e queremos replicar a mesma configuração para outro elemento, usamos a vírgula. </a:t>
+            </a:r>
+          </a:p>
+          <a:p>
+            <a:r>
+              <a:rPr lang="pt-BR" b="1" dirty="0" err="1">
+                <a:solidFill>
+                  <a:srgbClr val="7030A0"/>
+                </a:solidFill>
+              </a:rPr>
+              <a:t>form</a:t>
+            </a:r>
+            <a:r>
+              <a:rPr lang="pt-BR" b="1" dirty="0">
+                <a:solidFill>
+                  <a:srgbClr val="7030A0"/>
+                </a:solidFill>
+              </a:rPr>
+              <a:t> input</a:t>
+            </a:r>
+            <a:r>
+              <a:rPr lang="pt-BR" dirty="0"/>
+              <a:t>,</a:t>
+            </a:r>
+            <a:br>
+              <a:rPr lang="pt-BR" dirty="0"/>
+            </a:br>
+            <a:r>
+              <a:rPr lang="pt-BR" b="1" dirty="0" err="1">
+                <a:solidFill>
+                  <a:srgbClr val="7030A0"/>
+                </a:solidFill>
+              </a:rPr>
+              <a:t>form</a:t>
+            </a:r>
+            <a:r>
+              <a:rPr lang="pt-BR" b="1" dirty="0">
+                <a:solidFill>
+                  <a:srgbClr val="7030A0"/>
+                </a:solidFill>
+              </a:rPr>
+              <a:t> </a:t>
+            </a:r>
+            <a:r>
+              <a:rPr lang="pt-BR" b="1" dirty="0" err="1">
+                <a:solidFill>
+                  <a:srgbClr val="7030A0"/>
+                </a:solidFill>
+              </a:rPr>
+              <a:t>textarea</a:t>
+            </a:r>
+            <a:r>
+              <a:rPr lang="pt-BR" b="1" dirty="0">
+                <a:solidFill>
+                  <a:srgbClr val="7030A0"/>
+                </a:solidFill>
+              </a:rPr>
+              <a:t> </a:t>
+            </a:r>
+            <a:r>
+              <a:rPr lang="pt-BR" dirty="0"/>
+              <a:t>{</a:t>
+            </a:r>
+            <a:br>
+              <a:rPr lang="pt-BR" dirty="0"/>
+            </a:br>
+            <a:r>
+              <a:rPr lang="pt-BR" dirty="0"/>
+              <a:t>    display: </a:t>
+            </a:r>
+            <a:r>
+              <a:rPr lang="pt-BR" b="1" dirty="0" err="1">
+                <a:solidFill>
+                  <a:srgbClr val="7030A0"/>
+                </a:solidFill>
+              </a:rPr>
+              <a:t>block</a:t>
+            </a:r>
+            <a:r>
+              <a:rPr lang="pt-BR" dirty="0"/>
+              <a:t>;</a:t>
+            </a:r>
+            <a:br>
+              <a:rPr lang="pt-BR" dirty="0"/>
+            </a:br>
+            <a:r>
+              <a:rPr lang="pt-BR" dirty="0"/>
+              <a:t>    </a:t>
+            </a:r>
+            <a:r>
+              <a:rPr lang="pt-BR" dirty="0" err="1"/>
+              <a:t>margin</a:t>
+            </a:r>
+            <a:r>
+              <a:rPr lang="pt-BR" dirty="0"/>
+              <a:t>: </a:t>
+            </a:r>
+            <a:r>
+              <a:rPr lang="pt-BR" b="1" dirty="0">
+                <a:solidFill>
+                  <a:schemeClr val="accent1"/>
+                </a:solidFill>
+              </a:rPr>
+              <a:t>0 0 20px</a:t>
+            </a:r>
+            <a:r>
+              <a:rPr lang="pt-BR" dirty="0"/>
+              <a:t>;</a:t>
+            </a:r>
+            <a:br>
+              <a:rPr lang="pt-BR" dirty="0"/>
+            </a:br>
+            <a:r>
+              <a:rPr lang="pt-BR" dirty="0"/>
+              <a:t>    </a:t>
+            </a:r>
+            <a:r>
+              <a:rPr lang="pt-BR" dirty="0" err="1"/>
+              <a:t>padding</a:t>
+            </a:r>
+            <a:r>
+              <a:rPr lang="pt-BR" dirty="0"/>
+              <a:t>: </a:t>
+            </a:r>
+            <a:r>
+              <a:rPr lang="pt-BR" b="1" dirty="0">
+                <a:solidFill>
+                  <a:schemeClr val="accent1"/>
+                </a:solidFill>
+              </a:rPr>
+              <a:t>10px 25px</a:t>
+            </a:r>
+            <a:r>
+              <a:rPr lang="pt-BR" dirty="0"/>
+              <a:t>;</a:t>
+            </a:r>
+            <a:br>
+              <a:rPr lang="pt-BR" dirty="0"/>
+            </a:br>
+            <a:r>
+              <a:rPr lang="pt-BR" dirty="0"/>
+              <a:t>    </a:t>
+            </a:r>
+            <a:r>
+              <a:rPr lang="pt-BR" dirty="0" err="1"/>
+              <a:t>width</a:t>
+            </a:r>
+            <a:r>
+              <a:rPr lang="pt-BR" dirty="0"/>
+              <a:t>: </a:t>
+            </a:r>
+            <a:r>
+              <a:rPr lang="pt-BR" b="1" dirty="0">
+                <a:solidFill>
+                  <a:schemeClr val="accent1"/>
+                </a:solidFill>
+              </a:rPr>
+              <a:t>50%;</a:t>
+            </a:r>
+            <a:br>
+              <a:rPr lang="pt-BR" dirty="0"/>
+            </a:br>
+            <a:r>
+              <a:rPr lang="pt-BR" dirty="0"/>
+              <a:t>}</a:t>
+            </a:r>
+          </a:p>
+          <a:p>
+            <a:r>
+              <a:rPr lang="pt-BR" dirty="0"/>
+              <a:t>O </a:t>
+            </a:r>
+            <a:r>
+              <a:rPr lang="pt-BR" dirty="0" err="1">
+                <a:solidFill>
+                  <a:srgbClr val="7030A0"/>
+                </a:solidFill>
+              </a:rPr>
+              <a:t>textarea</a:t>
+            </a:r>
+            <a:r>
+              <a:rPr lang="pt-BR" dirty="0">
+                <a:solidFill>
+                  <a:srgbClr val="7030A0"/>
+                </a:solidFill>
+              </a:rPr>
+              <a:t> </a:t>
+            </a:r>
+            <a:r>
+              <a:rPr lang="pt-BR" dirty="0"/>
+              <a:t>e o </a:t>
+            </a:r>
+            <a:r>
+              <a:rPr lang="pt-BR" dirty="0">
+                <a:solidFill>
+                  <a:srgbClr val="7030A0"/>
+                </a:solidFill>
+              </a:rPr>
+              <a:t>input</a:t>
+            </a:r>
+            <a:r>
+              <a:rPr lang="pt-BR" dirty="0"/>
+              <a:t> agora têm as mesmas configurações de espaçamento interno, espaçamento externo, de largura e de visualização do tipo de display.</a:t>
+            </a:r>
+          </a:p>
+          <a:p>
+            <a:r>
+              <a:rPr lang="en-US" dirty="0" err="1"/>
+              <a:t>Colocando</a:t>
+            </a:r>
+            <a:r>
+              <a:rPr lang="en-US" dirty="0"/>
+              <a:t> o </a:t>
+            </a:r>
+            <a:r>
+              <a:rPr lang="en-US" dirty="0">
+                <a:solidFill>
+                  <a:srgbClr val="7030A0"/>
+                </a:solidFill>
+              </a:rPr>
+              <a:t>input</a:t>
+            </a:r>
+            <a:r>
+              <a:rPr lang="en-US" dirty="0"/>
+              <a:t> </a:t>
+            </a:r>
+            <a:r>
+              <a:rPr lang="en-US" dirty="0" err="1"/>
+              <a:t>dentro</a:t>
+            </a:r>
+            <a:r>
+              <a:rPr lang="en-US" dirty="0"/>
+              <a:t> do </a:t>
+            </a:r>
+            <a:r>
+              <a:rPr lang="en-US" dirty="0">
+                <a:solidFill>
+                  <a:srgbClr val="7030A0"/>
+                </a:solidFill>
+              </a:rPr>
+              <a:t>label</a:t>
+            </a:r>
+            <a:r>
+              <a:rPr lang="en-US" dirty="0"/>
+              <a:t>: </a:t>
+            </a:r>
+          </a:p>
+          <a:p>
+            <a:r>
+              <a:rPr lang="en-US" dirty="0"/>
+              <a:t>&lt;</a:t>
+            </a:r>
+            <a:r>
+              <a:rPr lang="en-US" b="1" dirty="0">
+                <a:solidFill>
+                  <a:srgbClr val="7030A0"/>
+                </a:solidFill>
+              </a:rPr>
+              <a:t>label</a:t>
+            </a:r>
+            <a:r>
+              <a:rPr lang="en-US" dirty="0"/>
+              <a:t> </a:t>
+            </a:r>
+            <a:r>
+              <a:rPr lang="en-US" b="1" dirty="0">
+                <a:solidFill>
+                  <a:schemeClr val="accent4">
+                    <a:lumMod val="75000"/>
+                  </a:schemeClr>
+                </a:solidFill>
+              </a:rPr>
+              <a:t>for</a:t>
+            </a:r>
+            <a:r>
+              <a:rPr lang="en-US" dirty="0"/>
+              <a:t>=</a:t>
+            </a:r>
+            <a:r>
+              <a:rPr lang="en-US" b="1" dirty="0">
+                <a:solidFill>
+                  <a:schemeClr val="accent6"/>
+                </a:solidFill>
+              </a:rPr>
+              <a:t>"radio-email“</a:t>
+            </a:r>
+            <a:r>
+              <a:rPr lang="en-US" dirty="0"/>
+              <a:t>&gt;&lt;</a:t>
+            </a:r>
+            <a:r>
+              <a:rPr lang="en-US" b="1" dirty="0">
+                <a:solidFill>
+                  <a:srgbClr val="7030A0"/>
+                </a:solidFill>
+              </a:rPr>
+              <a:t>input</a:t>
+            </a:r>
+            <a:r>
+              <a:rPr lang="en-US" dirty="0"/>
+              <a:t> </a:t>
+            </a:r>
+            <a:r>
+              <a:rPr lang="en-US" b="1" dirty="0">
+                <a:solidFill>
+                  <a:schemeClr val="accent4">
+                    <a:lumMod val="75000"/>
+                  </a:schemeClr>
+                </a:solidFill>
+              </a:rPr>
+              <a:t>type</a:t>
+            </a:r>
+            <a:r>
+              <a:rPr lang="en-US" dirty="0"/>
+              <a:t>=</a:t>
+            </a:r>
+            <a:r>
+              <a:rPr lang="en-US" b="1" dirty="0">
+                <a:solidFill>
+                  <a:schemeClr val="accent6"/>
+                </a:solidFill>
+              </a:rPr>
+              <a:t>"radio" </a:t>
+            </a:r>
+            <a:r>
+              <a:rPr lang="en-US" b="1" dirty="0">
+                <a:solidFill>
+                  <a:schemeClr val="accent4">
+                    <a:lumMod val="75000"/>
+                  </a:schemeClr>
+                </a:solidFill>
+              </a:rPr>
+              <a:t>name</a:t>
+            </a:r>
+            <a:r>
+              <a:rPr lang="en-US" dirty="0"/>
+              <a:t>=</a:t>
+            </a:r>
+            <a:r>
+              <a:rPr lang="en-US" b="1" dirty="0">
+                <a:solidFill>
+                  <a:schemeClr val="accent6"/>
+                </a:solidFill>
+              </a:rPr>
+              <a:t>"</a:t>
+            </a:r>
+            <a:r>
+              <a:rPr lang="en-US" b="1" dirty="0" err="1">
+                <a:solidFill>
+                  <a:schemeClr val="accent6"/>
+                </a:solidFill>
+              </a:rPr>
+              <a:t>contato</a:t>
+            </a:r>
+            <a:r>
+              <a:rPr lang="en-US" b="1" dirty="0">
+                <a:solidFill>
+                  <a:schemeClr val="accent6"/>
+                </a:solidFill>
+              </a:rPr>
+              <a:t>" </a:t>
+            </a:r>
+            <a:r>
+              <a:rPr lang="en-US" b="1" dirty="0">
+                <a:solidFill>
+                  <a:schemeClr val="accent4">
+                    <a:lumMod val="75000"/>
+                  </a:schemeClr>
+                </a:solidFill>
+              </a:rPr>
+              <a:t>value</a:t>
+            </a:r>
+            <a:r>
+              <a:rPr lang="en-US" dirty="0"/>
+              <a:t>=</a:t>
+            </a:r>
+            <a:r>
+              <a:rPr lang="en-US" b="1" dirty="0">
+                <a:solidFill>
+                  <a:schemeClr val="accent6"/>
+                </a:solidFill>
+              </a:rPr>
+              <a:t>"email" </a:t>
+            </a:r>
+            <a:r>
+              <a:rPr lang="en-US" b="1" dirty="0">
+                <a:solidFill>
+                  <a:schemeClr val="accent4">
+                    <a:lumMod val="75000"/>
+                  </a:schemeClr>
+                </a:solidFill>
+              </a:rPr>
+              <a:t>id</a:t>
+            </a:r>
+            <a:r>
+              <a:rPr lang="en-US" dirty="0"/>
+              <a:t>=</a:t>
+            </a:r>
+            <a:r>
+              <a:rPr lang="en-US" b="1" dirty="0">
+                <a:solidFill>
+                  <a:schemeClr val="accent6"/>
+                </a:solidFill>
+              </a:rPr>
+              <a:t>"radio-email“</a:t>
+            </a:r>
+            <a:r>
+              <a:rPr lang="en-US" dirty="0"/>
+              <a:t>&gt;Email&lt;/</a:t>
+            </a:r>
+            <a:r>
+              <a:rPr lang="en-US" b="1" dirty="0">
+                <a:solidFill>
+                  <a:srgbClr val="7030A0"/>
+                </a:solidFill>
+              </a:rPr>
+              <a:t>label</a:t>
+            </a:r>
+            <a:r>
+              <a:rPr lang="en-US" dirty="0"/>
+              <a:t>&gt;</a:t>
+            </a:r>
+            <a:endParaRPr lang="pt-BR" dirty="0"/>
+          </a:p>
+          <a:p>
+            <a:endParaRPr lang="pt-BR" dirty="0"/>
+          </a:p>
+          <a:p>
+            <a:endParaRPr lang="pt-BR" dirty="0"/>
+          </a:p>
           <a:p>
             <a:endParaRPr lang="pt-BR" dirty="0"/>
           </a:p>
@@ -2500,7 +2944,7 @@
           <p:cNvPr id="2" name="Título 1">
             <a:extLst>
               <a:ext uri="{FF2B5EF4-FFF2-40B4-BE49-F238E27FC236}">
-                <a16:creationId xmlns:a16="http://schemas.microsoft.com/office/drawing/2014/main" id="{EB424036-CD91-0DC9-09CC-8E667D2E7020}"/>
+                <a16:creationId xmlns:a16="http://schemas.microsoft.com/office/drawing/2014/main" id="{4E99849B-FB1A-831F-8760-C634887D656A}"/>
               </a:ext>
             </a:extLst>
           </p:cNvPr>
@@ -2516,7 +2960,10 @@
           <a:bodyPr/>
           <a:lstStyle/>
           <a:p>
-            <a:endParaRPr lang="pt-BR"/>
+            <a:r>
+              <a:rPr lang="pt-BR" dirty="0"/>
+              <a:t>Aprendizado – Tipos de campos diferentes</a:t>
+            </a:r>
           </a:p>
         </p:txBody>
       </p:sp>
@@ -2525,7 +2972,7 @@
           <p:cNvPr id="3" name="Espaço Reservado para Conteúdo 2">
             <a:extLst>
               <a:ext uri="{FF2B5EF4-FFF2-40B4-BE49-F238E27FC236}">
-                <a16:creationId xmlns:a16="http://schemas.microsoft.com/office/drawing/2014/main" id="{D2592569-8613-8B16-FAA6-EB65CDAAD0A4}"/>
+                <a16:creationId xmlns:a16="http://schemas.microsoft.com/office/drawing/2014/main" id="{764C5324-489F-DAB6-0F9E-4BAD253A26DA}"/>
               </a:ext>
             </a:extLst>
           </p:cNvPr>
@@ -2536,21 +2983,113 @@
             <p:ph sz="quarter" idx="10"/>
           </p:nvPr>
         </p:nvSpPr>
-        <p:spPr/>
+        <p:spPr>
+          <a:xfrm>
+            <a:off x="539496" y="1435607"/>
+            <a:ext cx="4416552" cy="5171669"/>
+          </a:xfrm>
+        </p:spPr>
         <p:txBody>
-          <a:bodyPr/>
+          <a:bodyPr>
+            <a:normAutofit/>
+          </a:bodyPr>
           <a:lstStyle/>
           <a:p>
-            <a:endParaRPr lang="pt-BR"/>
+            <a:r>
+              <a:rPr lang="pt-BR" dirty="0"/>
+              <a:t>Quando temos duas </a:t>
+            </a:r>
+            <a:r>
+              <a:rPr lang="pt-BR" dirty="0" err="1"/>
+              <a:t>tags</a:t>
+            </a:r>
+            <a:r>
+              <a:rPr lang="pt-BR" dirty="0"/>
+              <a:t>, nós temos o dobro da força do seletor. Todo seletor é configurado a partir de uma força.</a:t>
+            </a:r>
+          </a:p>
+          <a:p>
+            <a:endParaRPr lang="pt-BR" dirty="0"/>
+          </a:p>
+          <a:p>
+            <a:endParaRPr lang="pt-BR" dirty="0"/>
+          </a:p>
+          <a:p>
+            <a:endParaRPr lang="pt-BR" dirty="0"/>
+          </a:p>
+          <a:p>
+            <a:endParaRPr lang="pt-BR" dirty="0"/>
+          </a:p>
+          <a:p>
+            <a:r>
+              <a:rPr lang="pt-BR" dirty="0"/>
+              <a:t>Imagine que nessas três caixas nós temos a primeira sendo o identificador, a segunda sendo a classe, e por último a </a:t>
+            </a:r>
+            <a:r>
+              <a:rPr lang="pt-BR" dirty="0" err="1"/>
+              <a:t>tag</a:t>
+            </a:r>
+            <a:r>
+              <a:rPr lang="pt-BR" dirty="0"/>
+              <a:t>.</a:t>
+            </a:r>
+          </a:p>
+          <a:p>
+            <a:r>
+              <a:rPr lang="pt-BR" b="1" dirty="0" err="1"/>
+              <a:t>Tag</a:t>
+            </a:r>
+            <a:r>
+              <a:rPr lang="pt-BR" dirty="0"/>
+              <a:t> -&gt; força </a:t>
+            </a:r>
+            <a:r>
+              <a:rPr lang="pt-BR" b="1" dirty="0"/>
+              <a:t>1</a:t>
+            </a:r>
+            <a:br>
+              <a:rPr lang="pt-BR" dirty="0"/>
+            </a:br>
+            <a:r>
+              <a:rPr lang="pt-BR" b="1" dirty="0"/>
+              <a:t>Classe</a:t>
+            </a:r>
+            <a:r>
+              <a:rPr lang="pt-BR" dirty="0"/>
+              <a:t> -&gt; força </a:t>
+            </a:r>
+            <a:r>
+              <a:rPr lang="pt-BR" b="1" dirty="0"/>
+              <a:t>10</a:t>
+            </a:r>
+            <a:br>
+              <a:rPr lang="pt-BR" dirty="0"/>
+            </a:br>
+            <a:r>
+              <a:rPr lang="pt-BR" b="1" dirty="0"/>
+              <a:t>Identificador </a:t>
+            </a:r>
+            <a:r>
+              <a:rPr lang="pt-BR" dirty="0"/>
+              <a:t>-&gt; força </a:t>
+            </a:r>
+            <a:r>
+              <a:rPr lang="pt-BR" b="1" dirty="0"/>
+              <a:t>100</a:t>
+            </a:r>
+            <a:r>
+              <a:rPr lang="pt-BR" dirty="0"/>
+              <a:t>. </a:t>
+            </a:r>
           </a:p>
         </p:txBody>
       </p:sp>
       <p:pic>
         <p:nvPicPr>
-          <p:cNvPr id="7" name="Imagem 6">
+          <p:cNvPr id="4" name="Imagem 3">
             <a:extLst>
               <a:ext uri="{FF2B5EF4-FFF2-40B4-BE49-F238E27FC236}">
-                <a16:creationId xmlns:a16="http://schemas.microsoft.com/office/drawing/2014/main" id="{5D1DAC07-F64B-5058-9B30-9EB221EDA566}"/>
+                <a16:creationId xmlns:a16="http://schemas.microsoft.com/office/drawing/2014/main" id="{680D5B2D-555B-5717-0021-13ED10ACF110}"/>
               </a:ext>
             </a:extLst>
           </p:cNvPr>
@@ -2566,8 +3105,8 @@
         </p:blipFill>
         <p:spPr>
           <a:xfrm>
-            <a:off x="5545393" y="2497393"/>
-            <a:ext cx="5899355" cy="2231923"/>
+            <a:off x="639095" y="2244212"/>
+            <a:ext cx="3891755" cy="1472381"/>
           </a:xfrm>
           <a:prstGeom prst="rect">
             <a:avLst/>
@@ -2595,10 +3134,1195 @@
           </a:sp3d>
         </p:spPr>
       </p:pic>
+      <p:sp>
+        <p:nvSpPr>
+          <p:cNvPr id="5" name="Espaço Reservado para Conteúdo 2">
+            <a:extLst>
+              <a:ext uri="{FF2B5EF4-FFF2-40B4-BE49-F238E27FC236}">
+                <a16:creationId xmlns:a16="http://schemas.microsoft.com/office/drawing/2014/main" id="{3728FD9C-3C27-3F7E-7D47-AD9C8DEBDF8F}"/>
+              </a:ext>
+            </a:extLst>
+          </p:cNvPr>
+          <p:cNvSpPr txBox="1">
+            <a:spLocks/>
+          </p:cNvSpPr>
+          <p:nvPr/>
+        </p:nvSpPr>
+        <p:spPr>
+          <a:xfrm>
+            <a:off x="6078153" y="1435606"/>
+            <a:ext cx="5750053" cy="5171669"/>
+          </a:xfrm>
+          <a:prstGeom prst="rect">
+            <a:avLst/>
+          </a:prstGeom>
+        </p:spPr>
+        <p:txBody>
+          <a:bodyPr vert="horz" lIns="91440" tIns="45720" rIns="91440" bIns="45720" rtlCol="0">
+            <a:normAutofit lnSpcReduction="10000"/>
+          </a:bodyPr>
+          <a:lstStyle>
+            <a:lvl1pPr marL="0" indent="0" algn="l" defTabSz="914400" rtl="0" eaLnBrk="1" latinLnBrk="0" hangingPunct="1">
+              <a:lnSpc>
+                <a:spcPct val="150000"/>
+              </a:lnSpc>
+              <a:spcBef>
+                <a:spcPts val="1000"/>
+              </a:spcBef>
+              <a:spcAft>
+                <a:spcPts val="1200"/>
+              </a:spcAft>
+              <a:buFontTx/>
+              <a:buNone/>
+              <a:defRPr lang="en-US" sz="1200" kern="1200" smtClean="0">
+                <a:solidFill>
+                  <a:schemeClr val="tx1">
+                    <a:lumMod val="75000"/>
+                    <a:lumOff val="25000"/>
+                  </a:schemeClr>
+                </a:solidFill>
+                <a:latin typeface="+mn-lt"/>
+                <a:ea typeface="+mn-ea"/>
+                <a:cs typeface="+mn-cs"/>
+              </a:defRPr>
+            </a:lvl1pPr>
+            <a:lvl2pPr marL="228600" indent="-228600" algn="l" defTabSz="914400" rtl="0" eaLnBrk="1" latinLnBrk="0" hangingPunct="1">
+              <a:lnSpc>
+                <a:spcPct val="150000"/>
+              </a:lnSpc>
+              <a:spcBef>
+                <a:spcPts val="1000"/>
+              </a:spcBef>
+              <a:spcAft>
+                <a:spcPts val="1200"/>
+              </a:spcAft>
+              <a:buFont typeface="Arial" panose="020B0604020202020204" pitchFamily="34" charset="0"/>
+              <a:buChar char="•"/>
+              <a:defRPr lang="en-US" sz="1200" kern="1200" smtClean="0">
+                <a:solidFill>
+                  <a:schemeClr val="tx1">
+                    <a:lumMod val="75000"/>
+                    <a:lumOff val="25000"/>
+                  </a:schemeClr>
+                </a:solidFill>
+                <a:latin typeface="+mn-lt"/>
+                <a:ea typeface="+mn-ea"/>
+                <a:cs typeface="+mn-cs"/>
+              </a:defRPr>
+            </a:lvl2pPr>
+            <a:lvl3pPr marL="685800" indent="-228600" algn="l" defTabSz="914400" rtl="0" eaLnBrk="1" latinLnBrk="0" hangingPunct="1">
+              <a:lnSpc>
+                <a:spcPct val="150000"/>
+              </a:lnSpc>
+              <a:spcBef>
+                <a:spcPts val="1000"/>
+              </a:spcBef>
+              <a:spcAft>
+                <a:spcPts val="1200"/>
+              </a:spcAft>
+              <a:buFont typeface="Arial" panose="020B0604020202020204" pitchFamily="34" charset="0"/>
+              <a:buChar char="•"/>
+              <a:defRPr lang="en-US" sz="1200" kern="1200" smtClean="0">
+                <a:solidFill>
+                  <a:schemeClr val="tx1">
+                    <a:lumMod val="75000"/>
+                    <a:lumOff val="25000"/>
+                  </a:schemeClr>
+                </a:solidFill>
+                <a:latin typeface="+mn-lt"/>
+                <a:ea typeface="+mn-ea"/>
+                <a:cs typeface="+mn-cs"/>
+              </a:defRPr>
+            </a:lvl3pPr>
+            <a:lvl4pPr marL="1143000" indent="-228600" algn="l" defTabSz="914400" rtl="0" eaLnBrk="1" latinLnBrk="0" hangingPunct="1">
+              <a:lnSpc>
+                <a:spcPct val="150000"/>
+              </a:lnSpc>
+              <a:spcBef>
+                <a:spcPts val="1000"/>
+              </a:spcBef>
+              <a:spcAft>
+                <a:spcPts val="1200"/>
+              </a:spcAft>
+              <a:buFont typeface="Arial" panose="020B0604020202020204" pitchFamily="34" charset="0"/>
+              <a:buChar char="•"/>
+              <a:defRPr lang="en-US" sz="1200" kern="1200" smtClean="0">
+                <a:solidFill>
+                  <a:schemeClr val="tx1">
+                    <a:lumMod val="75000"/>
+                    <a:lumOff val="25000"/>
+                  </a:schemeClr>
+                </a:solidFill>
+                <a:latin typeface="+mn-lt"/>
+                <a:ea typeface="+mn-ea"/>
+                <a:cs typeface="+mn-cs"/>
+              </a:defRPr>
+            </a:lvl4pPr>
+            <a:lvl5pPr marL="1600200" indent="-228600" algn="l" defTabSz="914400" rtl="0" eaLnBrk="1" latinLnBrk="0" hangingPunct="1">
+              <a:lnSpc>
+                <a:spcPct val="150000"/>
+              </a:lnSpc>
+              <a:spcBef>
+                <a:spcPts val="1000"/>
+              </a:spcBef>
+              <a:spcAft>
+                <a:spcPts val="1200"/>
+              </a:spcAft>
+              <a:buFont typeface="Arial" panose="020B0604020202020204" pitchFamily="34" charset="0"/>
+              <a:buChar char="•"/>
+              <a:defRPr lang="en-US" sz="1200" kern="1200">
+                <a:solidFill>
+                  <a:schemeClr val="tx1">
+                    <a:lumMod val="75000"/>
+                    <a:lumOff val="25000"/>
+                  </a:schemeClr>
+                </a:solidFill>
+                <a:latin typeface="+mn-lt"/>
+                <a:ea typeface="+mn-ea"/>
+                <a:cs typeface="+mn-cs"/>
+              </a:defRPr>
+            </a:lvl5pPr>
+            <a:lvl6pPr marL="2057400" indent="-228600" algn="l" defTabSz="914400" rtl="0" eaLnBrk="1" latinLnBrk="0" hangingPunct="1">
+              <a:lnSpc>
+                <a:spcPct val="150000"/>
+              </a:lnSpc>
+              <a:spcBef>
+                <a:spcPts val="1000"/>
+              </a:spcBef>
+              <a:spcAft>
+                <a:spcPts val="1200"/>
+              </a:spcAft>
+              <a:buFont typeface="Arial" panose="020B0604020202020204" pitchFamily="34" charset="0"/>
+              <a:buChar char="•"/>
+              <a:defRPr lang="en-US" sz="1200" kern="1200" dirty="0" smtClean="0">
+                <a:solidFill>
+                  <a:schemeClr val="tx1"/>
+                </a:solidFill>
+                <a:latin typeface="+mn-lt"/>
+                <a:ea typeface="+mn-ea"/>
+                <a:cs typeface="+mn-cs"/>
+              </a:defRPr>
+            </a:lvl6pPr>
+            <a:lvl7pPr marL="2514600" indent="-228600" algn="l" defTabSz="914400" rtl="0" eaLnBrk="1" latinLnBrk="0" hangingPunct="1">
+              <a:lnSpc>
+                <a:spcPct val="150000"/>
+              </a:lnSpc>
+              <a:spcBef>
+                <a:spcPts val="1000"/>
+              </a:spcBef>
+              <a:spcAft>
+                <a:spcPts val="1200"/>
+              </a:spcAft>
+              <a:buFont typeface="Arial" panose="020B0604020202020204" pitchFamily="34" charset="0"/>
+              <a:buChar char="•"/>
+              <a:defRPr lang="en-US" sz="1200" kern="1200" dirty="0" smtClean="0">
+                <a:solidFill>
+                  <a:schemeClr val="tx1"/>
+                </a:solidFill>
+                <a:latin typeface="+mn-lt"/>
+                <a:ea typeface="+mn-ea"/>
+                <a:cs typeface="+mn-cs"/>
+              </a:defRPr>
+            </a:lvl7pPr>
+            <a:lvl8pPr marL="2971800" indent="-228600" algn="l" defTabSz="914400" rtl="0" eaLnBrk="1" latinLnBrk="0" hangingPunct="1">
+              <a:lnSpc>
+                <a:spcPct val="150000"/>
+              </a:lnSpc>
+              <a:spcBef>
+                <a:spcPts val="1000"/>
+              </a:spcBef>
+              <a:spcAft>
+                <a:spcPts val="1200"/>
+              </a:spcAft>
+              <a:buFont typeface="Arial" panose="020B0604020202020204" pitchFamily="34" charset="0"/>
+              <a:buChar char="•"/>
+              <a:defRPr lang="en-US" sz="1200" kern="1200" dirty="0" smtClean="0">
+                <a:solidFill>
+                  <a:schemeClr val="tx1"/>
+                </a:solidFill>
+                <a:latin typeface="+mn-lt"/>
+                <a:ea typeface="+mn-ea"/>
+                <a:cs typeface="+mn-cs"/>
+              </a:defRPr>
+            </a:lvl8pPr>
+            <a:lvl9pPr marL="3429000" indent="-228600" algn="l" defTabSz="914400" rtl="0" eaLnBrk="1" latinLnBrk="0" hangingPunct="1">
+              <a:lnSpc>
+                <a:spcPct val="90000"/>
+              </a:lnSpc>
+              <a:spcBef>
+                <a:spcPct val="30000"/>
+              </a:spcBef>
+              <a:buFont typeface="Arial" panose="020B0604020202020204" pitchFamily="34" charset="0"/>
+              <a:buNone/>
+              <a:defRPr sz="1200" kern="1200">
+                <a:solidFill>
+                  <a:schemeClr val="tx1"/>
+                </a:solidFill>
+                <a:latin typeface="+mn-lt"/>
+                <a:ea typeface="+mn-ea"/>
+                <a:cs typeface="+mn-cs"/>
+              </a:defRPr>
+            </a:lvl9pPr>
+          </a:lstStyle>
+          <a:p>
+            <a:r>
+              <a:rPr lang="pt-BR" dirty="0"/>
+              <a:t>Toda vez que temos um seletor daquele tipo, “</a:t>
+            </a:r>
+            <a:r>
+              <a:rPr lang="pt-BR" b="1" dirty="0">
+                <a:solidFill>
+                  <a:srgbClr val="7030A0"/>
+                </a:solidFill>
+              </a:rPr>
+              <a:t>p</a:t>
+            </a:r>
+            <a:r>
+              <a:rPr lang="pt-BR" dirty="0"/>
+              <a:t>”, isso quer dizer que a força desse seletor é 1. </a:t>
+            </a:r>
+          </a:p>
+          <a:p>
+            <a:r>
+              <a:rPr lang="pt-BR" dirty="0"/>
+              <a:t>Quando temos o “</a:t>
+            </a:r>
+            <a:r>
+              <a:rPr lang="pt-BR" b="1" dirty="0" err="1">
+                <a:solidFill>
+                  <a:srgbClr val="7030A0"/>
+                </a:solidFill>
+              </a:rPr>
+              <a:t>form</a:t>
+            </a:r>
+            <a:r>
+              <a:rPr lang="pt-BR" b="1" dirty="0">
+                <a:solidFill>
+                  <a:srgbClr val="7030A0"/>
+                </a:solidFill>
+              </a:rPr>
+              <a:t> p</a:t>
+            </a:r>
+            <a:r>
+              <a:rPr lang="pt-BR" dirty="0"/>
+              <a:t>” a força disso é 1+1, a força disso é 2. Então 2, como é mais forte que o 1, o estilo aplicado vai ser o segundo, do “</a:t>
+            </a:r>
+            <a:r>
+              <a:rPr lang="pt-BR" b="1" dirty="0" err="1">
+                <a:solidFill>
+                  <a:srgbClr val="7030A0"/>
+                </a:solidFill>
+              </a:rPr>
+              <a:t>form</a:t>
+            </a:r>
+            <a:r>
+              <a:rPr lang="pt-BR" b="1" dirty="0">
+                <a:solidFill>
+                  <a:srgbClr val="7030A0"/>
+                </a:solidFill>
+              </a:rPr>
+              <a:t> p</a:t>
+            </a:r>
+            <a:r>
+              <a:rPr lang="pt-BR" dirty="0"/>
+              <a:t>”.</a:t>
+            </a:r>
+          </a:p>
+          <a:p>
+            <a:r>
+              <a:rPr lang="pt-BR" b="1" dirty="0">
+                <a:solidFill>
+                  <a:schemeClr val="accent4">
+                    <a:lumMod val="75000"/>
+                  </a:schemeClr>
+                </a:solidFill>
+              </a:rPr>
+              <a:t>.teste </a:t>
+            </a:r>
+            <a:r>
+              <a:rPr lang="pt-BR" dirty="0"/>
+              <a:t>é uma classe aplicada no </a:t>
+            </a:r>
+            <a:r>
+              <a:rPr lang="pt-BR" b="1" dirty="0">
+                <a:solidFill>
+                  <a:srgbClr val="7030A0"/>
+                </a:solidFill>
+              </a:rPr>
+              <a:t>p </a:t>
+            </a:r>
+            <a:r>
+              <a:rPr lang="pt-BR" dirty="0"/>
+              <a:t>-&gt; A classe tem uma força 10, ela é superior a esses dois marcadores que colocamos aqui. Então “</a:t>
+            </a:r>
+            <a:r>
+              <a:rPr lang="pt-BR" b="1" dirty="0">
+                <a:solidFill>
+                  <a:schemeClr val="accent4">
+                    <a:lumMod val="75000"/>
+                  </a:schemeClr>
+                </a:solidFill>
+              </a:rPr>
+              <a:t>.teste </a:t>
+            </a:r>
+            <a:r>
+              <a:rPr lang="pt-BR" dirty="0"/>
+              <a:t>10”.</a:t>
+            </a:r>
+          </a:p>
+          <a:p>
+            <a:r>
+              <a:rPr lang="pt-BR" dirty="0"/>
+              <a:t>Marcador com configuração -&gt; </a:t>
+            </a:r>
+            <a:r>
+              <a:rPr lang="pt-BR" b="1" dirty="0" err="1">
+                <a:solidFill>
+                  <a:srgbClr val="7030A0"/>
+                </a:solidFill>
+              </a:rPr>
+              <a:t>p</a:t>
+            </a:r>
+            <a:r>
+              <a:rPr lang="pt-BR" b="1" dirty="0" err="1">
+                <a:solidFill>
+                  <a:schemeClr val="accent4">
+                    <a:lumMod val="75000"/>
+                  </a:schemeClr>
+                </a:solidFill>
+              </a:rPr>
+              <a:t>.teste</a:t>
+            </a:r>
+            <a:r>
+              <a:rPr lang="pt-BR" b="1" dirty="0">
+                <a:solidFill>
+                  <a:schemeClr val="accent4">
+                    <a:lumMod val="75000"/>
+                  </a:schemeClr>
+                </a:solidFill>
+              </a:rPr>
+              <a:t> </a:t>
+            </a:r>
+            <a:br>
+              <a:rPr lang="pt-BR" dirty="0"/>
+            </a:br>
+            <a:r>
+              <a:rPr lang="pt-BR" dirty="0"/>
+              <a:t>Só os parágrafos que têm aquela classe vão ter essa cor. </a:t>
+            </a:r>
+          </a:p>
+          <a:p>
+            <a:r>
+              <a:rPr lang="pt-BR" dirty="0"/>
+              <a:t>Somamos, a classe tem a força 10, e a </a:t>
+            </a:r>
+            <a:r>
+              <a:rPr lang="pt-BR" dirty="0" err="1"/>
+              <a:t>tag</a:t>
+            </a:r>
+            <a:r>
+              <a:rPr lang="pt-BR" dirty="0"/>
+              <a:t> tem a força 1, então com 11 ele vai ser mais forte que o teste especificamente. </a:t>
+            </a:r>
+          </a:p>
+          <a:p>
+            <a:r>
+              <a:rPr lang="pt-BR" dirty="0"/>
+              <a:t>O mais forte deles é o </a:t>
+            </a:r>
+            <a:r>
+              <a:rPr lang="pt-BR" b="1" dirty="0">
+                <a:solidFill>
+                  <a:schemeClr val="accent4">
+                    <a:lumMod val="75000"/>
+                  </a:schemeClr>
+                </a:solidFill>
+                <a:highlight>
+                  <a:srgbClr val="FFFF00"/>
+                </a:highlight>
+              </a:rPr>
+              <a:t> identificador</a:t>
+            </a:r>
+            <a:r>
+              <a:rPr lang="pt-BR" dirty="0"/>
+              <a:t>, tem a </a:t>
+            </a:r>
+            <a:r>
+              <a:rPr lang="pt-BR" b="1" dirty="0">
+                <a:solidFill>
+                  <a:schemeClr val="accent4">
+                    <a:lumMod val="75000"/>
+                  </a:schemeClr>
+                </a:solidFill>
+              </a:rPr>
+              <a:t>força 100</a:t>
+            </a:r>
+            <a:r>
+              <a:rPr lang="pt-BR" dirty="0"/>
+              <a:t>. Então sempre que estamos criando CSS, precisamos pensar em o quão específico é o nosso marcador e o quão forte ele vai ser para que não seja sobrescrito por qualquer outro, e que não cometamos nenhum erro no nosso código.</a:t>
+            </a:r>
+          </a:p>
+        </p:txBody>
+      </p:sp>
     </p:spTree>
     <p:extLst>
       <p:ext uri="{BB962C8B-B14F-4D97-AF65-F5344CB8AC3E}">
-        <p14:creationId xmlns:p14="http://schemas.microsoft.com/office/powerpoint/2010/main" val="3349778009"/>
+        <p14:creationId xmlns:p14="http://schemas.microsoft.com/office/powerpoint/2010/main" val="1355120981"/>
+      </p:ext>
+    </p:extLst>
+  </p:cSld>
+  <p:clrMapOvr>
+    <a:masterClrMapping/>
+  </p:clrMapOvr>
+</p:sld>
+</file>
+
+<file path=ppt/slides/slide12.xml><?xml version="1.0" encoding="utf-8"?>
+<p:sld xmlns:a="http://schemas.openxmlformats.org/drawingml/2006/main" xmlns:r="http://schemas.openxmlformats.org/officeDocument/2006/relationships" xmlns:p="http://schemas.openxmlformats.org/presentationml/2006/main">
+  <p:cSld>
+    <p:spTree>
+      <p:nvGrpSpPr>
+        <p:cNvPr id="1" name=""/>
+        <p:cNvGrpSpPr/>
+        <p:nvPr/>
+      </p:nvGrpSpPr>
+      <p:grpSpPr>
+        <a:xfrm>
+          <a:off x="0" y="0"/>
+          <a:ext cx="0" cy="0"/>
+          <a:chOff x="0" y="0"/>
+          <a:chExt cx="0" cy="0"/>
+        </a:xfrm>
+      </p:grpSpPr>
+      <p:sp>
+        <p:nvSpPr>
+          <p:cNvPr id="2" name="Título 1">
+            <a:extLst>
+              <a:ext uri="{FF2B5EF4-FFF2-40B4-BE49-F238E27FC236}">
+                <a16:creationId xmlns:a16="http://schemas.microsoft.com/office/drawing/2014/main" id="{16D34BC4-453E-1BBE-81E2-8F6582206C1D}"/>
+              </a:ext>
+            </a:extLst>
+          </p:cNvPr>
+          <p:cNvSpPr>
+            <a:spLocks noGrp="1"/>
+          </p:cNvSpPr>
+          <p:nvPr>
+            <p:ph type="title"/>
+          </p:nvPr>
+        </p:nvSpPr>
+        <p:spPr/>
+        <p:txBody>
+          <a:bodyPr/>
+          <a:lstStyle/>
+          <a:p>
+            <a:r>
+              <a:rPr lang="pt-BR" dirty="0"/>
+              <a:t>Aprendizado – Tipos de campos diferentes</a:t>
+            </a:r>
+          </a:p>
+        </p:txBody>
+      </p:sp>
+      <p:sp>
+        <p:nvSpPr>
+          <p:cNvPr id="3" name="Espaço Reservado para Conteúdo 2">
+            <a:extLst>
+              <a:ext uri="{FF2B5EF4-FFF2-40B4-BE49-F238E27FC236}">
+                <a16:creationId xmlns:a16="http://schemas.microsoft.com/office/drawing/2014/main" id="{9EACE44D-9E57-C70C-FC79-8D9EAF5560B6}"/>
+              </a:ext>
+            </a:extLst>
+          </p:cNvPr>
+          <p:cNvSpPr>
+            <a:spLocks noGrp="1"/>
+          </p:cNvSpPr>
+          <p:nvPr>
+            <p:ph sz="quarter" idx="10"/>
+          </p:nvPr>
+        </p:nvSpPr>
+        <p:spPr/>
+        <p:txBody>
+          <a:bodyPr/>
+          <a:lstStyle/>
+          <a:p>
+            <a:r>
+              <a:rPr lang="pt-BR" dirty="0"/>
+              <a:t>A única forma de alterarmos isso e alguma coisa mais forte que o identificador é quando temos o </a:t>
+            </a:r>
+            <a:r>
+              <a:rPr lang="pt-BR" b="1" dirty="0"/>
+              <a:t>estilo </a:t>
+            </a:r>
+            <a:r>
+              <a:rPr lang="pt-BR" b="1" dirty="0" err="1"/>
+              <a:t>inline</a:t>
+            </a:r>
+            <a:r>
+              <a:rPr lang="pt-BR" dirty="0"/>
+              <a:t>. </a:t>
+            </a:r>
+          </a:p>
+          <a:p>
+            <a:r>
+              <a:rPr lang="pt-BR" dirty="0"/>
+              <a:t>O estilo </a:t>
+            </a:r>
+            <a:r>
+              <a:rPr lang="pt-BR" dirty="0" err="1"/>
+              <a:t>inline</a:t>
+            </a:r>
+            <a:r>
+              <a:rPr lang="pt-BR" dirty="0"/>
+              <a:t> é no HTML. Então se adicionarmos uma propriedade “</a:t>
+            </a:r>
+            <a:r>
+              <a:rPr lang="pt-BR" dirty="0" err="1"/>
+              <a:t>style</a:t>
+            </a:r>
+            <a:r>
+              <a:rPr lang="pt-BR" dirty="0"/>
+              <a:t>”, e colocarmos o color igual a roxo, no nosso navegador, ao recarregar, a cor vai ser roxo. </a:t>
+            </a:r>
+          </a:p>
+          <a:p>
+            <a:r>
+              <a:rPr lang="pt-BR" dirty="0"/>
+              <a:t>Nada substitui o </a:t>
+            </a:r>
+            <a:r>
+              <a:rPr lang="pt-BR" dirty="0" err="1"/>
+              <a:t>inline</a:t>
+            </a:r>
+            <a:r>
+              <a:rPr lang="pt-BR" dirty="0"/>
+              <a:t>, ele é muito específico, ele está no elemento, e por isso ele é o mais forte. Ele teria o que seria equivalente a uma força 1000, e nada substitui isso.</a:t>
+            </a:r>
+          </a:p>
+        </p:txBody>
+      </p:sp>
+    </p:spTree>
+    <p:extLst>
+      <p:ext uri="{BB962C8B-B14F-4D97-AF65-F5344CB8AC3E}">
+        <p14:creationId xmlns:p14="http://schemas.microsoft.com/office/powerpoint/2010/main" val="121435306"/>
+      </p:ext>
+    </p:extLst>
+  </p:cSld>
+  <p:clrMapOvr>
+    <a:masterClrMapping/>
+  </p:clrMapOvr>
+</p:sld>
+</file>
+
+<file path=ppt/slides/slide13.xml><?xml version="1.0" encoding="utf-8"?>
+<p:sld xmlns:a="http://schemas.openxmlformats.org/drawingml/2006/main" xmlns:r="http://schemas.openxmlformats.org/officeDocument/2006/relationships" xmlns:p="http://schemas.openxmlformats.org/presentationml/2006/main">
+  <p:cSld>
+    <p:spTree>
+      <p:nvGrpSpPr>
+        <p:cNvPr id="1" name=""/>
+        <p:cNvGrpSpPr/>
+        <p:nvPr/>
+      </p:nvGrpSpPr>
+      <p:grpSpPr>
+        <a:xfrm>
+          <a:off x="0" y="0"/>
+          <a:ext cx="0" cy="0"/>
+          <a:chOff x="0" y="0"/>
+          <a:chExt cx="0" cy="0"/>
+        </a:xfrm>
+      </p:grpSpPr>
+      <p:sp>
+        <p:nvSpPr>
+          <p:cNvPr id="2" name="Título 1">
+            <a:extLst>
+              <a:ext uri="{FF2B5EF4-FFF2-40B4-BE49-F238E27FC236}">
+                <a16:creationId xmlns:a16="http://schemas.microsoft.com/office/drawing/2014/main" id="{AF4DFBCA-EE56-FCFC-10C1-7C8CA51050B9}"/>
+              </a:ext>
+            </a:extLst>
+          </p:cNvPr>
+          <p:cNvSpPr>
+            <a:spLocks noGrp="1"/>
+          </p:cNvSpPr>
+          <p:nvPr>
+            <p:ph type="title"/>
+          </p:nvPr>
+        </p:nvSpPr>
+        <p:spPr/>
+        <p:txBody>
+          <a:bodyPr/>
+          <a:lstStyle/>
+          <a:p>
+            <a:r>
+              <a:rPr lang="pt-BR" dirty="0"/>
+              <a:t>Aprendizado – Tipos de campos diferentes</a:t>
+            </a:r>
+          </a:p>
+        </p:txBody>
+      </p:sp>
+      <p:sp>
+        <p:nvSpPr>
+          <p:cNvPr id="3" name="Espaço Reservado para Conteúdo 2">
+            <a:extLst>
+              <a:ext uri="{FF2B5EF4-FFF2-40B4-BE49-F238E27FC236}">
+                <a16:creationId xmlns:a16="http://schemas.microsoft.com/office/drawing/2014/main" id="{C7255A30-D053-6CF6-57F1-C248293313A7}"/>
+              </a:ext>
+            </a:extLst>
+          </p:cNvPr>
+          <p:cNvSpPr>
+            <a:spLocks noGrp="1"/>
+          </p:cNvSpPr>
+          <p:nvPr>
+            <p:ph sz="quarter" idx="10"/>
+          </p:nvPr>
+        </p:nvSpPr>
+        <p:spPr>
+          <a:xfrm>
+            <a:off x="442549" y="1602758"/>
+            <a:ext cx="4709554" cy="4974336"/>
+          </a:xfrm>
+        </p:spPr>
+        <p:txBody>
+          <a:bodyPr/>
+          <a:lstStyle/>
+          <a:p>
+            <a:r>
+              <a:rPr lang="pt-BR" dirty="0"/>
+              <a:t>O seletor não é um campo do tipo input, ele é um campo do tipo </a:t>
+            </a:r>
+            <a:r>
+              <a:rPr lang="pt-BR" dirty="0" err="1">
+                <a:solidFill>
+                  <a:srgbClr val="7030A0"/>
+                </a:solidFill>
+              </a:rPr>
+              <a:t>select</a:t>
+            </a:r>
+            <a:r>
+              <a:rPr lang="pt-BR" dirty="0"/>
+              <a:t>, e um campo do tipo </a:t>
+            </a:r>
+            <a:r>
+              <a:rPr lang="pt-BR" dirty="0" err="1">
+                <a:solidFill>
+                  <a:srgbClr val="7030A0"/>
+                </a:solidFill>
+              </a:rPr>
+              <a:t>select</a:t>
+            </a:r>
+            <a:r>
+              <a:rPr lang="pt-BR" dirty="0"/>
+              <a:t> tem dentro dele várias opções. </a:t>
+            </a:r>
+          </a:p>
+          <a:p>
+            <a:r>
+              <a:rPr lang="pt-BR" dirty="0"/>
+              <a:t>As opções são campos de conteúdo, e aqui eu vou colocar os valores:</a:t>
+            </a:r>
+          </a:p>
+          <a:p>
+            <a:r>
+              <a:rPr lang="pt-BR" dirty="0"/>
+              <a:t>&lt;</a:t>
+            </a:r>
+            <a:r>
+              <a:rPr lang="pt-BR" b="1" dirty="0" err="1">
+                <a:solidFill>
+                  <a:srgbClr val="7030A0"/>
+                </a:solidFill>
+              </a:rPr>
+              <a:t>option</a:t>
+            </a:r>
+            <a:r>
+              <a:rPr lang="pt-BR" dirty="0"/>
+              <a:t>&gt;Manhã&lt;/</a:t>
+            </a:r>
+            <a:r>
+              <a:rPr lang="pt-BR" b="1" dirty="0" err="1">
+                <a:solidFill>
+                  <a:srgbClr val="7030A0"/>
+                </a:solidFill>
+              </a:rPr>
+              <a:t>option</a:t>
+            </a:r>
+            <a:r>
+              <a:rPr lang="pt-BR" dirty="0"/>
+              <a:t>&gt;, uma outra opção que é a &lt;</a:t>
+            </a:r>
+            <a:r>
+              <a:rPr lang="pt-BR" b="1" dirty="0" err="1">
+                <a:solidFill>
+                  <a:srgbClr val="7030A0"/>
+                </a:solidFill>
+              </a:rPr>
+              <a:t>option</a:t>
+            </a:r>
+            <a:r>
+              <a:rPr lang="pt-BR" dirty="0"/>
+              <a:t>&gt;Tarde&lt;/</a:t>
+            </a:r>
+            <a:r>
+              <a:rPr lang="pt-BR" b="1" dirty="0" err="1">
+                <a:solidFill>
+                  <a:srgbClr val="7030A0"/>
+                </a:solidFill>
+              </a:rPr>
+              <a:t>option</a:t>
+            </a:r>
+            <a:r>
+              <a:rPr lang="pt-BR" dirty="0"/>
+              <a:t>&gt; e uma outra opção que é a &lt;</a:t>
+            </a:r>
+            <a:r>
+              <a:rPr lang="pt-BR" b="1" dirty="0" err="1">
+                <a:solidFill>
+                  <a:srgbClr val="7030A0"/>
+                </a:solidFill>
+              </a:rPr>
+              <a:t>option</a:t>
+            </a:r>
+            <a:r>
+              <a:rPr lang="pt-BR" dirty="0"/>
+              <a:t>&gt;Noite&lt;/</a:t>
+            </a:r>
+            <a:r>
+              <a:rPr lang="pt-BR" b="1" dirty="0" err="1">
+                <a:solidFill>
+                  <a:srgbClr val="7030A0"/>
+                </a:solidFill>
+              </a:rPr>
+              <a:t>option</a:t>
+            </a:r>
+            <a:r>
+              <a:rPr lang="pt-BR" dirty="0"/>
+              <a:t>&gt;.</a:t>
+            </a:r>
+          </a:p>
+          <a:p>
+            <a:r>
+              <a:rPr lang="pt-BR" dirty="0"/>
+              <a:t>A estrutura da </a:t>
+            </a:r>
+            <a:r>
+              <a:rPr lang="pt-BR" dirty="0" err="1"/>
+              <a:t>tag</a:t>
+            </a:r>
+            <a:r>
+              <a:rPr lang="pt-BR" dirty="0"/>
+              <a:t> &lt;</a:t>
+            </a:r>
+            <a:r>
+              <a:rPr lang="pt-BR" b="1" dirty="0" err="1">
+                <a:solidFill>
+                  <a:srgbClr val="7030A0"/>
+                </a:solidFill>
+              </a:rPr>
+              <a:t>select</a:t>
+            </a:r>
+            <a:r>
+              <a:rPr lang="pt-BR" dirty="0"/>
+              <a:t>&gt; é composta de um ou mais &lt;</a:t>
+            </a:r>
+            <a:r>
+              <a:rPr lang="pt-BR" b="1" dirty="0" err="1">
+                <a:solidFill>
+                  <a:srgbClr val="7030A0"/>
+                </a:solidFill>
+              </a:rPr>
+              <a:t>option</a:t>
+            </a:r>
+            <a:r>
+              <a:rPr lang="pt-BR" dirty="0"/>
+              <a:t>&gt;.</a:t>
+            </a:r>
+          </a:p>
+        </p:txBody>
+      </p:sp>
+      <p:sp>
+        <p:nvSpPr>
+          <p:cNvPr id="4" name="Espaço Reservado para Conteúdo 2">
+            <a:extLst>
+              <a:ext uri="{FF2B5EF4-FFF2-40B4-BE49-F238E27FC236}">
+                <a16:creationId xmlns:a16="http://schemas.microsoft.com/office/drawing/2014/main" id="{56B83570-4F56-BAFA-E77F-289FC4D19D4C}"/>
+              </a:ext>
+            </a:extLst>
+          </p:cNvPr>
+          <p:cNvSpPr txBox="1">
+            <a:spLocks/>
+          </p:cNvSpPr>
+          <p:nvPr/>
+        </p:nvSpPr>
+        <p:spPr>
+          <a:xfrm>
+            <a:off x="5614219" y="1602758"/>
+            <a:ext cx="6361472" cy="5181502"/>
+          </a:xfrm>
+          <a:prstGeom prst="rect">
+            <a:avLst/>
+          </a:prstGeom>
+        </p:spPr>
+        <p:txBody>
+          <a:bodyPr vert="horz" lIns="91440" tIns="45720" rIns="91440" bIns="45720" rtlCol="0">
+            <a:normAutofit/>
+          </a:bodyPr>
+          <a:lstStyle>
+            <a:lvl1pPr marL="0" indent="0" algn="l" defTabSz="914400" rtl="0" eaLnBrk="1" latinLnBrk="0" hangingPunct="1">
+              <a:lnSpc>
+                <a:spcPct val="150000"/>
+              </a:lnSpc>
+              <a:spcBef>
+                <a:spcPts val="1000"/>
+              </a:spcBef>
+              <a:spcAft>
+                <a:spcPts val="1200"/>
+              </a:spcAft>
+              <a:buFontTx/>
+              <a:buNone/>
+              <a:defRPr lang="en-US" sz="1200" kern="1200" smtClean="0">
+                <a:solidFill>
+                  <a:schemeClr val="tx1">
+                    <a:lumMod val="75000"/>
+                    <a:lumOff val="25000"/>
+                  </a:schemeClr>
+                </a:solidFill>
+                <a:latin typeface="+mn-lt"/>
+                <a:ea typeface="+mn-ea"/>
+                <a:cs typeface="+mn-cs"/>
+              </a:defRPr>
+            </a:lvl1pPr>
+            <a:lvl2pPr marL="228600" indent="-228600" algn="l" defTabSz="914400" rtl="0" eaLnBrk="1" latinLnBrk="0" hangingPunct="1">
+              <a:lnSpc>
+                <a:spcPct val="150000"/>
+              </a:lnSpc>
+              <a:spcBef>
+                <a:spcPts val="1000"/>
+              </a:spcBef>
+              <a:spcAft>
+                <a:spcPts val="1200"/>
+              </a:spcAft>
+              <a:buFont typeface="Arial" panose="020B0604020202020204" pitchFamily="34" charset="0"/>
+              <a:buChar char="•"/>
+              <a:defRPr lang="en-US" sz="1200" kern="1200" smtClean="0">
+                <a:solidFill>
+                  <a:schemeClr val="tx1">
+                    <a:lumMod val="75000"/>
+                    <a:lumOff val="25000"/>
+                  </a:schemeClr>
+                </a:solidFill>
+                <a:latin typeface="+mn-lt"/>
+                <a:ea typeface="+mn-ea"/>
+                <a:cs typeface="+mn-cs"/>
+              </a:defRPr>
+            </a:lvl2pPr>
+            <a:lvl3pPr marL="685800" indent="-228600" algn="l" defTabSz="914400" rtl="0" eaLnBrk="1" latinLnBrk="0" hangingPunct="1">
+              <a:lnSpc>
+                <a:spcPct val="150000"/>
+              </a:lnSpc>
+              <a:spcBef>
+                <a:spcPts val="1000"/>
+              </a:spcBef>
+              <a:spcAft>
+                <a:spcPts val="1200"/>
+              </a:spcAft>
+              <a:buFont typeface="Arial" panose="020B0604020202020204" pitchFamily="34" charset="0"/>
+              <a:buChar char="•"/>
+              <a:defRPr lang="en-US" sz="1200" kern="1200" smtClean="0">
+                <a:solidFill>
+                  <a:schemeClr val="tx1">
+                    <a:lumMod val="75000"/>
+                    <a:lumOff val="25000"/>
+                  </a:schemeClr>
+                </a:solidFill>
+                <a:latin typeface="+mn-lt"/>
+                <a:ea typeface="+mn-ea"/>
+                <a:cs typeface="+mn-cs"/>
+              </a:defRPr>
+            </a:lvl3pPr>
+            <a:lvl4pPr marL="1143000" indent="-228600" algn="l" defTabSz="914400" rtl="0" eaLnBrk="1" latinLnBrk="0" hangingPunct="1">
+              <a:lnSpc>
+                <a:spcPct val="150000"/>
+              </a:lnSpc>
+              <a:spcBef>
+                <a:spcPts val="1000"/>
+              </a:spcBef>
+              <a:spcAft>
+                <a:spcPts val="1200"/>
+              </a:spcAft>
+              <a:buFont typeface="Arial" panose="020B0604020202020204" pitchFamily="34" charset="0"/>
+              <a:buChar char="•"/>
+              <a:defRPr lang="en-US" sz="1200" kern="1200" smtClean="0">
+                <a:solidFill>
+                  <a:schemeClr val="tx1">
+                    <a:lumMod val="75000"/>
+                    <a:lumOff val="25000"/>
+                  </a:schemeClr>
+                </a:solidFill>
+                <a:latin typeface="+mn-lt"/>
+                <a:ea typeface="+mn-ea"/>
+                <a:cs typeface="+mn-cs"/>
+              </a:defRPr>
+            </a:lvl4pPr>
+            <a:lvl5pPr marL="1600200" indent="-228600" algn="l" defTabSz="914400" rtl="0" eaLnBrk="1" latinLnBrk="0" hangingPunct="1">
+              <a:lnSpc>
+                <a:spcPct val="150000"/>
+              </a:lnSpc>
+              <a:spcBef>
+                <a:spcPts val="1000"/>
+              </a:spcBef>
+              <a:spcAft>
+                <a:spcPts val="1200"/>
+              </a:spcAft>
+              <a:buFont typeface="Arial" panose="020B0604020202020204" pitchFamily="34" charset="0"/>
+              <a:buChar char="•"/>
+              <a:defRPr lang="en-US" sz="1200" kern="1200">
+                <a:solidFill>
+                  <a:schemeClr val="tx1">
+                    <a:lumMod val="75000"/>
+                    <a:lumOff val="25000"/>
+                  </a:schemeClr>
+                </a:solidFill>
+                <a:latin typeface="+mn-lt"/>
+                <a:ea typeface="+mn-ea"/>
+                <a:cs typeface="+mn-cs"/>
+              </a:defRPr>
+            </a:lvl5pPr>
+            <a:lvl6pPr marL="2057400" indent="-228600" algn="l" defTabSz="914400" rtl="0" eaLnBrk="1" latinLnBrk="0" hangingPunct="1">
+              <a:lnSpc>
+                <a:spcPct val="150000"/>
+              </a:lnSpc>
+              <a:spcBef>
+                <a:spcPts val="1000"/>
+              </a:spcBef>
+              <a:spcAft>
+                <a:spcPts val="1200"/>
+              </a:spcAft>
+              <a:buFont typeface="Arial" panose="020B0604020202020204" pitchFamily="34" charset="0"/>
+              <a:buChar char="•"/>
+              <a:defRPr lang="en-US" sz="1200" kern="1200" dirty="0" smtClean="0">
+                <a:solidFill>
+                  <a:schemeClr val="tx1"/>
+                </a:solidFill>
+                <a:latin typeface="+mn-lt"/>
+                <a:ea typeface="+mn-ea"/>
+                <a:cs typeface="+mn-cs"/>
+              </a:defRPr>
+            </a:lvl6pPr>
+            <a:lvl7pPr marL="2514600" indent="-228600" algn="l" defTabSz="914400" rtl="0" eaLnBrk="1" latinLnBrk="0" hangingPunct="1">
+              <a:lnSpc>
+                <a:spcPct val="150000"/>
+              </a:lnSpc>
+              <a:spcBef>
+                <a:spcPts val="1000"/>
+              </a:spcBef>
+              <a:spcAft>
+                <a:spcPts val="1200"/>
+              </a:spcAft>
+              <a:buFont typeface="Arial" panose="020B0604020202020204" pitchFamily="34" charset="0"/>
+              <a:buChar char="•"/>
+              <a:defRPr lang="en-US" sz="1200" kern="1200" dirty="0" smtClean="0">
+                <a:solidFill>
+                  <a:schemeClr val="tx1"/>
+                </a:solidFill>
+                <a:latin typeface="+mn-lt"/>
+                <a:ea typeface="+mn-ea"/>
+                <a:cs typeface="+mn-cs"/>
+              </a:defRPr>
+            </a:lvl7pPr>
+            <a:lvl8pPr marL="2971800" indent="-228600" algn="l" defTabSz="914400" rtl="0" eaLnBrk="1" latinLnBrk="0" hangingPunct="1">
+              <a:lnSpc>
+                <a:spcPct val="150000"/>
+              </a:lnSpc>
+              <a:spcBef>
+                <a:spcPts val="1000"/>
+              </a:spcBef>
+              <a:spcAft>
+                <a:spcPts val="1200"/>
+              </a:spcAft>
+              <a:buFont typeface="Arial" panose="020B0604020202020204" pitchFamily="34" charset="0"/>
+              <a:buChar char="•"/>
+              <a:defRPr lang="en-US" sz="1200" kern="1200" dirty="0" smtClean="0">
+                <a:solidFill>
+                  <a:schemeClr val="tx1"/>
+                </a:solidFill>
+                <a:latin typeface="+mn-lt"/>
+                <a:ea typeface="+mn-ea"/>
+                <a:cs typeface="+mn-cs"/>
+              </a:defRPr>
+            </a:lvl8pPr>
+            <a:lvl9pPr marL="3429000" indent="-228600" algn="l" defTabSz="914400" rtl="0" eaLnBrk="1" latinLnBrk="0" hangingPunct="1">
+              <a:lnSpc>
+                <a:spcPct val="90000"/>
+              </a:lnSpc>
+              <a:spcBef>
+                <a:spcPct val="30000"/>
+              </a:spcBef>
+              <a:buFont typeface="Arial" panose="020B0604020202020204" pitchFamily="34" charset="0"/>
+              <a:buNone/>
+              <a:defRPr sz="1200" kern="1200">
+                <a:solidFill>
+                  <a:schemeClr val="tx1"/>
+                </a:solidFill>
+                <a:latin typeface="+mn-lt"/>
+                <a:ea typeface="+mn-ea"/>
+                <a:cs typeface="+mn-cs"/>
+              </a:defRPr>
+            </a:lvl9pPr>
+          </a:lstStyle>
+          <a:p>
+            <a:pPr>
+              <a:lnSpc>
+                <a:spcPct val="110000"/>
+              </a:lnSpc>
+            </a:pPr>
+            <a:r>
+              <a:rPr lang="pt-BR" b="1" dirty="0"/>
+              <a:t>Nesta aula, vimos:</a:t>
+            </a:r>
+          </a:p>
+          <a:p>
+            <a:pPr marL="171450" indent="-171450">
+              <a:lnSpc>
+                <a:spcPct val="110000"/>
+              </a:lnSpc>
+              <a:buFont typeface="Wingdings" panose="05000000000000000000" pitchFamily="2" charset="2"/>
+              <a:buChar char="q"/>
+            </a:pPr>
+            <a:r>
+              <a:rPr lang="pt-BR" dirty="0"/>
+              <a:t>O </a:t>
+            </a:r>
+            <a:r>
+              <a:rPr lang="pt-BR" dirty="0" err="1"/>
+              <a:t>textarea</a:t>
+            </a:r>
+            <a:r>
+              <a:rPr lang="pt-BR" dirty="0"/>
+              <a:t>, para entradas de texto de mais de uma linha</a:t>
+            </a:r>
+          </a:p>
+          <a:p>
+            <a:pPr marL="171450" indent="-171450">
+              <a:lnSpc>
+                <a:spcPct val="110000"/>
+              </a:lnSpc>
+              <a:buFont typeface="Wingdings" panose="05000000000000000000" pitchFamily="2" charset="2"/>
+              <a:buChar char="q"/>
+            </a:pPr>
+            <a:r>
+              <a:rPr lang="pt-BR" dirty="0"/>
+              <a:t>O input do tipo radio</a:t>
+            </a:r>
+          </a:p>
+          <a:p>
+            <a:pPr marL="171450" indent="-171450">
+              <a:lnSpc>
+                <a:spcPct val="110000"/>
+              </a:lnSpc>
+              <a:buFont typeface="Wingdings" panose="05000000000000000000" pitchFamily="2" charset="2"/>
+              <a:buChar char="q"/>
+            </a:pPr>
+            <a:r>
+              <a:rPr lang="pt-BR" dirty="0"/>
+              <a:t>Como agrupar vários input do tipo radio, impedindo que mais de um input seja selecionado</a:t>
+            </a:r>
+          </a:p>
+          <a:p>
+            <a:pPr marL="171450" indent="-171450">
+              <a:lnSpc>
+                <a:spcPct val="110000"/>
+              </a:lnSpc>
+              <a:buFont typeface="Wingdings" panose="05000000000000000000" pitchFamily="2" charset="2"/>
+              <a:buChar char="q"/>
+            </a:pPr>
+            <a:r>
+              <a:rPr lang="pt-BR" dirty="0"/>
+              <a:t>O input do tipo </a:t>
+            </a:r>
+            <a:r>
+              <a:rPr lang="pt-BR" dirty="0" err="1"/>
+              <a:t>checkbox</a:t>
+            </a:r>
+            <a:endParaRPr lang="pt-BR" dirty="0"/>
+          </a:p>
+          <a:p>
+            <a:pPr marL="171450" indent="-171450">
+              <a:lnSpc>
+                <a:spcPct val="110000"/>
+              </a:lnSpc>
+              <a:buFont typeface="Wingdings" panose="05000000000000000000" pitchFamily="2" charset="2"/>
+              <a:buChar char="q"/>
+            </a:pPr>
+            <a:r>
+              <a:rPr lang="pt-BR" dirty="0"/>
+              <a:t>Que podemos criar um input dentro de um </a:t>
+            </a:r>
+            <a:r>
+              <a:rPr lang="pt-BR" dirty="0" err="1"/>
+              <a:t>label</a:t>
+            </a:r>
+            <a:r>
+              <a:rPr lang="pt-BR" dirty="0"/>
+              <a:t>, assim associando-os</a:t>
+            </a:r>
+          </a:p>
+          <a:p>
+            <a:pPr marL="171450" indent="-171450">
+              <a:lnSpc>
+                <a:spcPct val="110000"/>
+              </a:lnSpc>
+              <a:buFont typeface="Wingdings" panose="05000000000000000000" pitchFamily="2" charset="2"/>
+              <a:buChar char="q"/>
+            </a:pPr>
+            <a:r>
+              <a:rPr lang="pt-BR" dirty="0"/>
+              <a:t>Mais estilizações para a nossa página</a:t>
+            </a:r>
+          </a:p>
+          <a:p>
+            <a:pPr marL="171450" indent="-171450">
+              <a:lnSpc>
+                <a:spcPct val="110000"/>
+              </a:lnSpc>
+              <a:buFont typeface="Wingdings" panose="05000000000000000000" pitchFamily="2" charset="2"/>
+              <a:buChar char="q"/>
+            </a:pPr>
+            <a:r>
+              <a:rPr lang="pt-BR" dirty="0"/>
+              <a:t>Como funciona a hierarquia no CSS</a:t>
+            </a:r>
+          </a:p>
+          <a:p>
+            <a:pPr marL="171450" indent="-171450">
+              <a:lnSpc>
+                <a:spcPct val="110000"/>
+              </a:lnSpc>
+              <a:buFont typeface="Wingdings" panose="05000000000000000000" pitchFamily="2" charset="2"/>
+              <a:buChar char="q"/>
+            </a:pPr>
+            <a:r>
+              <a:rPr lang="pt-BR" dirty="0"/>
+              <a:t>O </a:t>
+            </a:r>
+            <a:r>
+              <a:rPr lang="pt-BR" dirty="0" err="1"/>
+              <a:t>select</a:t>
+            </a:r>
+            <a:r>
+              <a:rPr lang="pt-BR" dirty="0"/>
+              <a:t>, que é seletor, um campo de seleção de um item, e o </a:t>
+            </a:r>
+            <a:r>
+              <a:rPr lang="pt-BR" dirty="0" err="1"/>
+              <a:t>option</a:t>
+            </a:r>
+            <a:r>
+              <a:rPr lang="pt-BR" dirty="0"/>
+              <a:t>, que representa cada opção do seletor</a:t>
+            </a:r>
+          </a:p>
+        </p:txBody>
+      </p:sp>
+    </p:spTree>
+    <p:extLst>
+      <p:ext uri="{BB962C8B-B14F-4D97-AF65-F5344CB8AC3E}">
+        <p14:creationId xmlns:p14="http://schemas.microsoft.com/office/powerpoint/2010/main" val="2779720703"/>
       </p:ext>
     </p:extLst>
   </p:cSld>

</xml_diff>